<commit_message>
research paper added;use case diagram modified;icon modified
</commit_message>
<xml_diff>
--- a/E-BloodBank_proposal.pptx
+++ b/E-BloodBank_proposal.pptx
@@ -212,7 +212,7 @@
           <a:p>
             <a:fld id="{F497D89B-7FE8-427F-9D1A-1BE2955D4B24}" type="datetime1">
               <a:rPr lang="en-US" smtClean="0"/>
-              <a:t>12/13/2020</a:t>
+              <a:t>12/14/2020</a:t>
             </a:fld>
             <a:endParaRPr lang="en-US"/>
           </a:p>
@@ -378,7 +378,7 @@
           <a:p>
             <a:fld id="{549668A2-1048-42E1-AD40-D6FA200D6E1A}" type="datetime1">
               <a:rPr lang="en-US" smtClean="0"/>
-              <a:t>12/13/2020</a:t>
+              <a:t>12/14/2020</a:t>
             </a:fld>
             <a:endParaRPr lang="en-US"/>
           </a:p>
@@ -734,7 +734,7 @@
           <a:p>
             <a:fld id="{322E03E7-A54E-4FE5-8988-8047630ACFF9}" type="datetime1">
               <a:rPr lang="en-US" smtClean="0"/>
-              <a:t>12/13/2020</a:t>
+              <a:t>12/14/2020</a:t>
             </a:fld>
             <a:endParaRPr lang="en-US"/>
           </a:p>
@@ -924,7 +924,7 @@
           <a:p>
             <a:fld id="{9DCDC8F9-7DD1-447A-93AF-9FF90FA31CCA}" type="datetime1">
               <a:rPr lang="en-US" smtClean="0"/>
-              <a:t>12/13/2020</a:t>
+              <a:t>12/14/2020</a:t>
             </a:fld>
             <a:endParaRPr lang="en-US"/>
           </a:p>
@@ -1244,7 +1244,7 @@
           <a:p>
             <a:fld id="{239A3359-BC13-4334-B3A0-07C7BB03EB3F}" type="datetime1">
               <a:rPr lang="en-US" smtClean="0"/>
-              <a:t>12/13/2020</a:t>
+              <a:t>12/14/2020</a:t>
             </a:fld>
             <a:endParaRPr lang="en-US"/>
           </a:p>
@@ -1467,7 +1467,7 @@
           <a:p>
             <a:fld id="{239A3359-BC13-4334-B3A0-07C7BB03EB3F}" type="datetime1">
               <a:rPr lang="en-US" smtClean="0"/>
-              <a:t>12/13/2020</a:t>
+              <a:t>12/14/2020</a:t>
             </a:fld>
             <a:endParaRPr lang="en-US"/>
           </a:p>
@@ -1759,7 +1759,7 @@
           <a:p>
             <a:fld id="{239A3359-BC13-4334-B3A0-07C7BB03EB3F}" type="datetime1">
               <a:rPr lang="en-US" smtClean="0"/>
-              <a:t>12/13/2020</a:t>
+              <a:t>12/14/2020</a:t>
             </a:fld>
             <a:endParaRPr lang="en-US"/>
           </a:p>
@@ -2214,7 +2214,7 @@
           <a:p>
             <a:fld id="{239A3359-BC13-4334-B3A0-07C7BB03EB3F}" type="datetime1">
               <a:rPr lang="en-US" smtClean="0"/>
-              <a:t>12/13/2020</a:t>
+              <a:t>12/14/2020</a:t>
             </a:fld>
             <a:endParaRPr lang="en-US"/>
           </a:p>
@@ -2791,7 +2791,7 @@
           <a:p>
             <a:fld id="{239A3359-BC13-4334-B3A0-07C7BB03EB3F}" type="datetime1">
               <a:rPr lang="en-US" smtClean="0"/>
-              <a:t>12/13/2020</a:t>
+              <a:t>12/14/2020</a:t>
             </a:fld>
             <a:endParaRPr lang="en-US"/>
           </a:p>
@@ -3653,7 +3653,7 @@
           <a:p>
             <a:fld id="{239A3359-BC13-4334-B3A0-07C7BB03EB3F}" type="datetime1">
               <a:rPr lang="en-US" smtClean="0"/>
-              <a:t>12/13/2020</a:t>
+              <a:t>12/14/2020</a:t>
             </a:fld>
             <a:endParaRPr lang="en-US"/>
           </a:p>
@@ -3859,7 +3859,7 @@
           <a:p>
             <a:fld id="{4AA03F31-FD22-415C-B8AC-6523596292B1}" type="datetime1">
               <a:rPr lang="en-US" smtClean="0"/>
-              <a:t>12/13/2020</a:t>
+              <a:t>12/14/2020</a:t>
             </a:fld>
             <a:endParaRPr lang="en-US"/>
           </a:p>
@@ -4073,7 +4073,7 @@
           <a:p>
             <a:fld id="{8BD69A6C-973A-4184-BAC9-729C2F192007}" type="datetime1">
               <a:rPr lang="en-US" smtClean="0"/>
-              <a:t>12/13/2020</a:t>
+              <a:t>12/14/2020</a:t>
             </a:fld>
             <a:endParaRPr lang="en-US"/>
           </a:p>
@@ -4278,7 +4278,7 @@
           <a:p>
             <a:fld id="{9A8784F4-644A-47F3-8F4A-7ED29E9976DE}" type="datetime1">
               <a:rPr lang="en-US" smtClean="0"/>
-              <a:t>12/13/2020</a:t>
+              <a:t>12/14/2020</a:t>
             </a:fld>
             <a:endParaRPr lang="en-US"/>
           </a:p>
@@ -4558,7 +4558,7 @@
           <a:p>
             <a:fld id="{341D1DB8-EAD0-41B5-AB0E-4DF3E6373953}" type="datetime1">
               <a:rPr lang="en-US" smtClean="0"/>
-              <a:t>12/13/2020</a:t>
+              <a:t>12/14/2020</a:t>
             </a:fld>
             <a:endParaRPr lang="en-US"/>
           </a:p>
@@ -4825,7 +4825,7 @@
           <a:p>
             <a:fld id="{454D2F19-784C-452E-8383-23B2760EDADF}" type="datetime1">
               <a:rPr lang="en-US" smtClean="0"/>
-              <a:t>12/13/2020</a:t>
+              <a:t>12/14/2020</a:t>
             </a:fld>
             <a:endParaRPr lang="en-US"/>
           </a:p>
@@ -5240,7 +5240,7 @@
           <a:p>
             <a:fld id="{408492E6-5F6C-41AA-9915-38D247175A9F}" type="datetime1">
               <a:rPr lang="en-US" smtClean="0"/>
-              <a:t>12/13/2020</a:t>
+              <a:t>12/14/2020</a:t>
             </a:fld>
             <a:endParaRPr lang="en-US"/>
           </a:p>
@@ -5388,7 +5388,7 @@
           <a:p>
             <a:fld id="{44206320-0579-4FA7-8FB7-A2744B5C5EB9}" type="datetime1">
               <a:rPr lang="en-US" smtClean="0"/>
-              <a:t>12/13/2020</a:t>
+              <a:t>12/14/2020</a:t>
             </a:fld>
             <a:endParaRPr lang="en-US"/>
           </a:p>
@@ -5513,7 +5513,7 @@
           <a:p>
             <a:fld id="{8832B38D-BF8F-4A5B-A4AB-0254F3C610B6}" type="datetime1">
               <a:rPr lang="en-US" smtClean="0"/>
-              <a:t>12/13/2020</a:t>
+              <a:t>12/14/2020</a:t>
             </a:fld>
             <a:endParaRPr lang="en-US"/>
           </a:p>
@@ -5797,7 +5797,7 @@
           <a:p>
             <a:fld id="{B1315C82-B713-4671-8936-19BC657981F2}" type="datetime1">
               <a:rPr lang="en-US" smtClean="0"/>
-              <a:t>12/13/2020</a:t>
+              <a:t>12/14/2020</a:t>
             </a:fld>
             <a:endParaRPr lang="en-US"/>
           </a:p>
@@ -6117,7 +6117,7 @@
           <a:p>
             <a:fld id="{DC5B920E-6499-4C59-AB99-66FB795B05E4}" type="datetime1">
               <a:rPr lang="en-US" smtClean="0"/>
-              <a:t>12/13/2020</a:t>
+              <a:t>12/14/2020</a:t>
             </a:fld>
             <a:endParaRPr lang="en-US"/>
           </a:p>
@@ -6370,7 +6370,7 @@
           <a:p>
             <a:fld id="{239A3359-BC13-4334-B3A0-07C7BB03EB3F}" type="datetime1">
               <a:rPr lang="en-US" smtClean="0"/>
-              <a:t>12/13/2020</a:t>
+              <a:t>12/14/2020</a:t>
             </a:fld>
             <a:endParaRPr lang="en-US"/>
           </a:p>
@@ -6992,7 +6992,7 @@
           <a:p>
             <a:fld id="{AE935C67-EB65-442A-8E92-C68A7A1AB141}" type="datetime1">
               <a:rPr lang="en-US" sz="2000" smtClean="0"/>
-              <a:t>12/13/2020</a:t>
+              <a:t>12/14/2020</a:t>
             </a:fld>
             <a:endParaRPr lang="en-US" sz="2000" dirty="0"/>
           </a:p>
@@ -7026,6 +7026,42 @@
           </a:p>
         </p:txBody>
       </p:sp>
+      <p:pic>
+        <p:nvPicPr>
+          <p:cNvPr id="9" name="Picture 8">
+            <a:extLst>
+              <a:ext uri="{FF2B5EF4-FFF2-40B4-BE49-F238E27FC236}">
+                <a16:creationId xmlns:a16="http://schemas.microsoft.com/office/drawing/2014/main" id="{A16D2228-E1C8-4CB5-98A4-FCB91D6C904F}"/>
+              </a:ext>
+            </a:extLst>
+          </p:cNvPr>
+          <p:cNvPicPr>
+            <a:picLocks noChangeAspect="1"/>
+          </p:cNvPicPr>
+          <p:nvPr/>
+        </p:nvPicPr>
+        <p:blipFill>
+          <a:blip r:embed="rId3">
+            <a:extLst>
+              <a:ext uri="{28A0092B-C50C-407E-A947-70E740481C1C}">
+                <a14:useLocalDpi xmlns:a14="http://schemas.microsoft.com/office/drawing/2010/main" val="0"/>
+              </a:ext>
+            </a:extLst>
+          </a:blip>
+          <a:stretch>
+            <a:fillRect/>
+          </a:stretch>
+        </p:blipFill>
+        <p:spPr>
+          <a:xfrm>
+            <a:off x="6709893" y="2342641"/>
+            <a:ext cx="4851042" cy="4851042"/>
+          </a:xfrm>
+          <a:prstGeom prst="rect">
+            <a:avLst/>
+          </a:prstGeom>
+        </p:spPr>
+      </p:pic>
     </p:spTree>
     <p:extLst>
       <p:ext uri="{BB962C8B-B14F-4D97-AF65-F5344CB8AC3E}">
@@ -7138,7 +7174,7 @@
           <a:p>
             <a:fld id="{9A8784F4-644A-47F3-8F4A-7ED29E9976DE}" type="datetime1">
               <a:rPr lang="en-US" sz="2000" smtClean="0"/>
-              <a:t>12/13/2020</a:t>
+              <a:t>12/14/2020</a:t>
             </a:fld>
             <a:endParaRPr lang="en-US" sz="2000" dirty="0"/>
           </a:p>
@@ -7169,6 +7205,101 @@
               <a:t>10</a:t>
             </a:fld>
             <a:endParaRPr lang="en-US" sz="2000" dirty="0"/>
+          </a:p>
+        </p:txBody>
+      </p:sp>
+      <p:sp>
+        <p:nvSpPr>
+          <p:cNvPr id="7" name="Oval 6">
+            <a:extLst>
+              <a:ext uri="{FF2B5EF4-FFF2-40B4-BE49-F238E27FC236}">
+                <a16:creationId xmlns:a16="http://schemas.microsoft.com/office/drawing/2014/main" id="{76626F48-FDE1-459B-8195-E01A520789EC}"/>
+              </a:ext>
+            </a:extLst>
+          </p:cNvPr>
+          <p:cNvSpPr/>
+          <p:nvPr/>
+        </p:nvSpPr>
+        <p:spPr>
+          <a:xfrm>
+            <a:off x="5112912" y="4121238"/>
+            <a:ext cx="1210614" cy="515155"/>
+          </a:xfrm>
+          <a:prstGeom prst="ellipse">
+            <a:avLst/>
+          </a:prstGeom>
+          <a:solidFill>
+            <a:schemeClr val="bg1"/>
+          </a:solidFill>
+          <a:ln>
+            <a:noFill/>
+          </a:ln>
+        </p:spPr>
+        <p:style>
+          <a:lnRef idx="2">
+            <a:schemeClr val="accent1">
+              <a:shade val="50000"/>
+            </a:schemeClr>
+          </a:lnRef>
+          <a:fillRef idx="1">
+            <a:schemeClr val="accent1"/>
+          </a:fillRef>
+          <a:effectRef idx="0">
+            <a:schemeClr val="accent1"/>
+          </a:effectRef>
+          <a:fontRef idx="minor">
+            <a:schemeClr val="lt1"/>
+          </a:fontRef>
+        </p:style>
+        <p:txBody>
+          <a:bodyPr rtlCol="0" anchor="ctr"/>
+          <a:lstStyle/>
+          <a:p>
+            <a:pPr algn="ctr"/>
+            <a:endParaRPr lang="en-US">
+              <a:solidFill>
+                <a:schemeClr val="tx1"/>
+              </a:solidFill>
+            </a:endParaRPr>
+          </a:p>
+        </p:txBody>
+      </p:sp>
+      <p:sp>
+        <p:nvSpPr>
+          <p:cNvPr id="3" name="TextBox 2">
+            <a:extLst>
+              <a:ext uri="{FF2B5EF4-FFF2-40B4-BE49-F238E27FC236}">
+                <a16:creationId xmlns:a16="http://schemas.microsoft.com/office/drawing/2014/main" id="{6B320298-39B8-4811-81EC-0EC5378E4CDE}"/>
+              </a:ext>
+            </a:extLst>
+          </p:cNvPr>
+          <p:cNvSpPr txBox="1"/>
+          <p:nvPr/>
+        </p:nvSpPr>
+        <p:spPr>
+          <a:xfrm>
+            <a:off x="5196624" y="4224926"/>
+            <a:ext cx="1043189" cy="307777"/>
+          </a:xfrm>
+          <a:prstGeom prst="rect">
+            <a:avLst/>
+          </a:prstGeom>
+          <a:noFill/>
+        </p:spPr>
+        <p:txBody>
+          <a:bodyPr wrap="square" rtlCol="0">
+            <a:spAutoFit/>
+          </a:bodyPr>
+          <a:lstStyle/>
+          <a:p>
+            <a:r>
+              <a:rPr lang="en-US" sz="1400" dirty="0">
+                <a:solidFill>
+                  <a:srgbClr val="707070"/>
+                </a:solidFill>
+              </a:rPr>
+              <a:t>Panic button</a:t>
+            </a:r>
           </a:p>
         </p:txBody>
       </p:sp>
@@ -7331,7 +7462,7 @@
           <a:p>
             <a:fld id="{9A8784F4-644A-47F3-8F4A-7ED29E9976DE}" type="datetime1">
               <a:rPr lang="en-US" sz="2000" smtClean="0"/>
-              <a:t>12/13/2020</a:t>
+              <a:t>12/14/2020</a:t>
             </a:fld>
             <a:endParaRPr lang="en-US" sz="2000" dirty="0"/>
           </a:p>
@@ -7540,7 +7671,7 @@
           <a:p>
             <a:fld id="{9A8784F4-644A-47F3-8F4A-7ED29E9976DE}" type="datetime1">
               <a:rPr lang="en-US" sz="2000" smtClean="0"/>
-              <a:t>12/13/2020</a:t>
+              <a:t>12/14/2020</a:t>
             </a:fld>
             <a:endParaRPr lang="en-US" sz="2000" dirty="0"/>
           </a:p>
@@ -7813,7 +7944,7 @@
           <a:p>
             <a:fld id="{9A8784F4-644A-47F3-8F4A-7ED29E9976DE}" type="datetime1">
               <a:rPr lang="en-US" sz="2000" smtClean="0"/>
-              <a:t>12/13/2020</a:t>
+              <a:t>12/14/2020</a:t>
             </a:fld>
             <a:endParaRPr lang="en-US" sz="2000" dirty="0"/>
           </a:p>
@@ -8033,7 +8164,7 @@
           <a:p>
             <a:fld id="{9A8784F4-644A-47F3-8F4A-7ED29E9976DE}" type="datetime1">
               <a:rPr lang="en-US" sz="2000" smtClean="0"/>
-              <a:t>12/13/2020</a:t>
+              <a:t>12/14/2020</a:t>
             </a:fld>
             <a:endParaRPr lang="en-US" sz="2000" dirty="0"/>
           </a:p>
@@ -8188,7 +8319,7 @@
           <a:p>
             <a:fld id="{9A8784F4-644A-47F3-8F4A-7ED29E9976DE}" type="datetime1">
               <a:rPr lang="en-US" sz="2000" smtClean="0"/>
-              <a:t>12/13/2020</a:t>
+              <a:t>12/14/2020</a:t>
             </a:fld>
             <a:endParaRPr lang="en-US" sz="2000" dirty="0"/>
           </a:p>
@@ -8379,7 +8510,7 @@
           <a:p>
             <a:fld id="{9A8784F4-644A-47F3-8F4A-7ED29E9976DE}" type="datetime1">
               <a:rPr lang="en-US" sz="2000" smtClean="0"/>
-              <a:t>12/13/2020</a:t>
+              <a:t>12/14/2020</a:t>
             </a:fld>
             <a:endParaRPr lang="en-US" sz="2000" dirty="0"/>
           </a:p>
@@ -8965,7 +9096,7 @@
           <a:p>
             <a:fld id="{9A8784F4-644A-47F3-8F4A-7ED29E9976DE}" type="datetime1">
               <a:rPr lang="en-US" sz="2000" smtClean="0"/>
-              <a:t>12/13/2020</a:t>
+              <a:t>12/14/2020</a:t>
             </a:fld>
             <a:endParaRPr lang="en-US" sz="2000" dirty="0"/>
           </a:p>
@@ -9082,7 +9213,7 @@
           <a:p>
             <a:fld id="{9A8784F4-644A-47F3-8F4A-7ED29E9976DE}" type="datetime1">
               <a:rPr lang="en-US" sz="2000" smtClean="0"/>
-              <a:t>12/13/2020</a:t>
+              <a:t>12/14/2020</a:t>
             </a:fld>
             <a:endParaRPr lang="en-US" sz="2000" dirty="0"/>
           </a:p>
@@ -9169,7 +9300,7 @@
           <a:p>
             <a:fld id="{9A8784F4-644A-47F3-8F4A-7ED29E9976DE}" type="datetime1">
               <a:rPr lang="en-US" smtClean="0"/>
-              <a:t>12/13/2020</a:t>
+              <a:t>12/14/2020</a:t>
             </a:fld>
             <a:endParaRPr lang="en-US"/>
           </a:p>
@@ -9477,7 +9608,7 @@
           <a:p>
             <a:fld id="{9A8784F4-644A-47F3-8F4A-7ED29E9976DE}" type="datetime1">
               <a:rPr lang="en-US" sz="2000" smtClean="0"/>
-              <a:t>12/13/2020</a:t>
+              <a:t>12/14/2020</a:t>
             </a:fld>
             <a:endParaRPr lang="en-US" sz="2000" dirty="0"/>
           </a:p>

</xml_diff>

<commit_message>
Slide - Expected Result summarized
</commit_message>
<xml_diff>
--- a/E-BloodBank_proposal.pptx
+++ b/E-BloodBank_proposal.pptx
@@ -7031,7 +7031,7 @@
           <p:cNvPr id="9" name="Picture 8">
             <a:extLst>
               <a:ext uri="{FF2B5EF4-FFF2-40B4-BE49-F238E27FC236}">
-                <a16:creationId xmlns:a16="http://schemas.microsoft.com/office/drawing/2014/main" id="{A16D2228-E1C8-4CB5-98A4-FCB91D6C904F}"/>
+                <a16:creationId xmlns:a16="http://schemas.microsoft.com/office/drawing/2014/main" xmlns="" id="{A16D2228-E1C8-4CB5-98A4-FCB91D6C904F}"/>
               </a:ext>
             </a:extLst>
           </p:cNvPr>
@@ -7213,7 +7213,7 @@
           <p:cNvPr id="7" name="Oval 6">
             <a:extLst>
               <a:ext uri="{FF2B5EF4-FFF2-40B4-BE49-F238E27FC236}">
-                <a16:creationId xmlns:a16="http://schemas.microsoft.com/office/drawing/2014/main" id="{76626F48-FDE1-459B-8195-E01A520789EC}"/>
+                <a16:creationId xmlns:a16="http://schemas.microsoft.com/office/drawing/2014/main" xmlns="" id="{76626F48-FDE1-459B-8195-E01A520789EC}"/>
               </a:ext>
             </a:extLst>
           </p:cNvPr>
@@ -7269,7 +7269,7 @@
           <p:cNvPr id="3" name="TextBox 2">
             <a:extLst>
               <a:ext uri="{FF2B5EF4-FFF2-40B4-BE49-F238E27FC236}">
-                <a16:creationId xmlns:a16="http://schemas.microsoft.com/office/drawing/2014/main" id="{6B320298-39B8-4811-81EC-0EC5378E4CDE}"/>
+                <a16:creationId xmlns:a16="http://schemas.microsoft.com/office/drawing/2014/main" xmlns="" id="{6B320298-39B8-4811-81EC-0EC5378E4CDE}"/>
               </a:ext>
             </a:extLst>
           </p:cNvPr>
@@ -7384,10 +7384,16 @@
               <a:buChar char="Ø"/>
             </a:pPr>
             <a:r>
+              <a:rPr lang="en-US" dirty="0" smtClean="0">
+                <a:latin typeface="Berlin Sans FB" panose="020E0602020502020306" pitchFamily="34" charset="0"/>
+              </a:rPr>
+              <a:t> VS </a:t>
+            </a:r>
+            <a:r>
               <a:rPr lang="en-US" dirty="0">
                 <a:latin typeface="Berlin Sans FB" panose="020E0602020502020306" pitchFamily="34" charset="0"/>
               </a:rPr>
-              <a:t>VS Code IDE </a:t>
+              <a:t>Code IDE </a:t>
             </a:r>
           </a:p>
           <a:p>
@@ -7396,11 +7402,14 @@
               <a:buChar char="Ø"/>
             </a:pPr>
             <a:r>
-              <a:rPr lang="en-US" dirty="0">
+              <a:rPr lang="en-US" dirty="0" smtClean="0">
                 <a:latin typeface="Berlin Sans FB" panose="020E0602020502020306" pitchFamily="34" charset="0"/>
               </a:rPr>
-              <a:t>Flutter</a:t>
-            </a:r>
+              <a:t> Flutter</a:t>
+            </a:r>
+            <a:endParaRPr lang="en-US" dirty="0">
+              <a:latin typeface="Berlin Sans FB" panose="020E0602020502020306" pitchFamily="34" charset="0"/>
+            </a:endParaRPr>
           </a:p>
           <a:p>
             <a:pPr>
@@ -7420,11 +7429,14 @@
               <a:buChar char="Ø"/>
             </a:pPr>
             <a:r>
-              <a:rPr lang="en-US" dirty="0">
+              <a:rPr lang="en-US" dirty="0" smtClean="0">
                 <a:latin typeface="Berlin Sans FB" panose="020E0602020502020306" pitchFamily="34" charset="0"/>
               </a:rPr>
-              <a:t>Windows</a:t>
-            </a:r>
+              <a:t> Windows</a:t>
+            </a:r>
+            <a:endParaRPr lang="en-US" dirty="0">
+              <a:latin typeface="Berlin Sans FB" panose="020E0602020502020306" pitchFamily="34" charset="0"/>
+            </a:endParaRPr>
           </a:p>
           <a:p>
             <a:pPr>
@@ -7432,10 +7444,16 @@
               <a:buChar char="Ø"/>
             </a:pPr>
             <a:r>
+              <a:rPr lang="en-US" dirty="0" smtClean="0">
+                <a:latin typeface="Berlin Sans FB" panose="020E0602020502020306" pitchFamily="34" charset="0"/>
+              </a:rPr>
+              <a:t> Android </a:t>
+            </a:r>
+            <a:r>
               <a:rPr lang="en-US" dirty="0">
                 <a:latin typeface="Berlin Sans FB" panose="020E0602020502020306" pitchFamily="34" charset="0"/>
               </a:rPr>
-              <a:t>Android device</a:t>
+              <a:t>device</a:t>
             </a:r>
           </a:p>
         </p:txBody>
@@ -7568,7 +7586,7 @@
         </p:spPr>
         <p:txBody>
           <a:bodyPr>
-            <a:normAutofit fontScale="85000" lnSpcReduction="10000"/>
+            <a:normAutofit/>
           </a:bodyPr>
           <a:lstStyle/>
           <a:p>
@@ -7577,10 +7595,16 @@
               <a:buChar char="Ø"/>
             </a:pPr>
             <a:r>
+              <a:rPr lang="en-GB" dirty="0" smtClean="0">
+                <a:latin typeface="Berlin Sans FB" panose="020E0602020502020306" pitchFamily="34" charset="0"/>
+              </a:rPr>
+              <a:t>notify </a:t>
+            </a:r>
+            <a:r>
               <a:rPr lang="en-GB" dirty="0">
                 <a:latin typeface="Berlin Sans FB" panose="020E0602020502020306" pitchFamily="34" charset="0"/>
               </a:rPr>
-              <a:t>E-Blood Bank will be able to notify the users as per their role in our system</a:t>
+              <a:t>the users as per their role in our system</a:t>
             </a:r>
           </a:p>
           <a:p>
@@ -7589,11 +7613,14 @@
               <a:buChar char="Ø"/>
             </a:pPr>
             <a:r>
-              <a:rPr lang="en-GB" dirty="0">
+              <a:rPr lang="en-GB" dirty="0" smtClean="0">
                 <a:latin typeface="Berlin Sans FB" panose="020E0602020502020306" pitchFamily="34" charset="0"/>
               </a:rPr>
-              <a:t>When there is any need of blood for recipient, he/she will press an emergency button for the demand of the blood mentioning a blood group and place</a:t>
-            </a:r>
+              <a:t>ON DEMAND BLOOD SOURCING AS PER CATEGORY</a:t>
+            </a:r>
+            <a:endParaRPr lang="en-GB" dirty="0">
+              <a:latin typeface="Berlin Sans FB" panose="020E0602020502020306" pitchFamily="34" charset="0"/>
+            </a:endParaRPr>
           </a:p>
           <a:p>
             <a:pPr>
@@ -7601,11 +7628,14 @@
               <a:buChar char="Ø"/>
             </a:pPr>
             <a:r>
-              <a:rPr lang="en-GB" dirty="0">
+              <a:rPr lang="en-GB" dirty="0" smtClean="0">
                 <a:latin typeface="Berlin Sans FB" panose="020E0602020502020306" pitchFamily="34" charset="0"/>
               </a:rPr>
-              <a:t> Then our system will scan the donors registered in the app near the area.</a:t>
-            </a:r>
+              <a:t>PROVIDE SHORTEST PATH TO THE DESTINATION</a:t>
+            </a:r>
+            <a:endParaRPr lang="en-GB" dirty="0" smtClean="0">
+              <a:latin typeface="Berlin Sans FB" panose="020E0602020502020306" pitchFamily="34" charset="0"/>
+            </a:endParaRPr>
           </a:p>
           <a:p>
             <a:pPr>
@@ -7613,10 +7643,28 @@
               <a:buChar char="Ø"/>
             </a:pPr>
             <a:r>
+              <a:rPr lang="en-GB" dirty="0" smtClean="0">
+                <a:latin typeface="Berlin Sans FB" panose="020E0602020502020306" pitchFamily="34" charset="0"/>
+              </a:rPr>
+              <a:t>Available </a:t>
+            </a:r>
+            <a:r>
               <a:rPr lang="en-GB" dirty="0">
                 <a:latin typeface="Berlin Sans FB" panose="020E0602020502020306" pitchFamily="34" charset="0"/>
               </a:rPr>
-              <a:t>The donor that would take least time to reach the blood seeker will be prioritized first which will be calculated by our system</a:t>
+              <a:t>possible donors residing nearby locations will be notified via </a:t>
+            </a:r>
+            <a:r>
+              <a:rPr lang="en-GB" dirty="0" smtClean="0">
+                <a:latin typeface="Berlin Sans FB" panose="020E0602020502020306" pitchFamily="34" charset="0"/>
+              </a:rPr>
+              <a:t>IN-APP alert buzzer AND SMS and </a:t>
+            </a:r>
+            <a:r>
+              <a:rPr lang="en-GB" dirty="0">
+                <a:latin typeface="Berlin Sans FB" panose="020E0602020502020306" pitchFamily="34" charset="0"/>
+              </a:rPr>
+              <a:t>the location information through GPS system will be provided</a:t>
             </a:r>
           </a:p>
           <a:p>
@@ -7625,22 +7673,16 @@
               <a:buChar char="Ø"/>
             </a:pPr>
             <a:r>
+              <a:rPr lang="en-GB" dirty="0" smtClean="0">
+                <a:latin typeface="Berlin Sans FB" panose="020E0602020502020306" pitchFamily="34" charset="0"/>
+              </a:rPr>
+              <a:t>notify </a:t>
+            </a:r>
+            <a:r>
               <a:rPr lang="en-GB" dirty="0">
                 <a:latin typeface="Berlin Sans FB" panose="020E0602020502020306" pitchFamily="34" charset="0"/>
               </a:rPr>
-              <a:t>Available possible donors residing nearby locations will be notified via alert buzzer in app or SMS if required and the location information through GPS system will be provided</a:t>
-            </a:r>
-          </a:p>
-          <a:p>
-            <a:pPr>
-              <a:buFont typeface="Wingdings" panose="05000000000000000000" pitchFamily="2" charset="2"/>
-              <a:buChar char="Ø"/>
-            </a:pPr>
-            <a:r>
-              <a:rPr lang="en-GB" dirty="0">
-                <a:latin typeface="Berlin Sans FB" panose="020E0602020502020306" pitchFamily="34" charset="0"/>
-              </a:rPr>
-              <a:t>Our system will also notify our users about the upcoming or ongoing related campaigns as well</a:t>
+              <a:t>our users about the upcoming or ongoing related campaigns as well</a:t>
             </a:r>
             <a:endParaRPr lang="en-US" dirty="0">
               <a:latin typeface="Berlin Sans FB" panose="020E0602020502020306" pitchFamily="34" charset="0"/>
@@ -8634,21 +8676,21 @@
                 <a:gridCol w="573206">
                   <a:extLst>
                     <a:ext uri="{9D8B030D-6E8A-4147-A177-3AD203B41FA5}">
-                      <a16:colId xmlns:a16="http://schemas.microsoft.com/office/drawing/2014/main" val="20000"/>
+                      <a16:colId xmlns:a16="http://schemas.microsoft.com/office/drawing/2014/main" xmlns="" val="20000"/>
                     </a:ext>
                   </a:extLst>
                 </a:gridCol>
                 <a:gridCol w="3234519">
                   <a:extLst>
                     <a:ext uri="{9D8B030D-6E8A-4147-A177-3AD203B41FA5}">
-                      <a16:colId xmlns:a16="http://schemas.microsoft.com/office/drawing/2014/main" val="20001"/>
+                      <a16:colId xmlns:a16="http://schemas.microsoft.com/office/drawing/2014/main" xmlns="" val="20001"/>
                     </a:ext>
                   </a:extLst>
                 </a:gridCol>
                 <a:gridCol w="8384275">
                   <a:extLst>
                     <a:ext uri="{9D8B030D-6E8A-4147-A177-3AD203B41FA5}">
-                      <a16:colId xmlns:a16="http://schemas.microsoft.com/office/drawing/2014/main" val="20002"/>
+                      <a16:colId xmlns:a16="http://schemas.microsoft.com/office/drawing/2014/main" xmlns="" val="20002"/>
                     </a:ext>
                   </a:extLst>
                 </a:gridCol>
@@ -8702,7 +8744,7 @@
                 </a:tc>
                 <a:extLst>
                   <a:ext uri="{0D108BD9-81ED-4DB2-BD59-A6C34878D82A}">
-                    <a16:rowId xmlns:a16="http://schemas.microsoft.com/office/drawing/2014/main" val="10000"/>
+                    <a16:rowId xmlns:a16="http://schemas.microsoft.com/office/drawing/2014/main" xmlns="" val="10000"/>
                   </a:ext>
                 </a:extLst>
               </a:tr>
@@ -8758,7 +8800,7 @@
                 </a:tc>
                 <a:extLst>
                   <a:ext uri="{0D108BD9-81ED-4DB2-BD59-A6C34878D82A}">
-                    <a16:rowId xmlns:a16="http://schemas.microsoft.com/office/drawing/2014/main" val="10001"/>
+                    <a16:rowId xmlns:a16="http://schemas.microsoft.com/office/drawing/2014/main" xmlns="" val="10001"/>
                   </a:ext>
                 </a:extLst>
               </a:tr>
@@ -8822,7 +8864,7 @@
                 </a:tc>
                 <a:extLst>
                   <a:ext uri="{0D108BD9-81ED-4DB2-BD59-A6C34878D82A}">
-                    <a16:rowId xmlns:a16="http://schemas.microsoft.com/office/drawing/2014/main" val="10002"/>
+                    <a16:rowId xmlns:a16="http://schemas.microsoft.com/office/drawing/2014/main" xmlns="" val="10002"/>
                   </a:ext>
                 </a:extLst>
               </a:tr>
@@ -8871,7 +8913,7 @@
                 </a:tc>
                 <a:extLst>
                   <a:ext uri="{0D108BD9-81ED-4DB2-BD59-A6C34878D82A}">
-                    <a16:rowId xmlns:a16="http://schemas.microsoft.com/office/drawing/2014/main" val="10003"/>
+                    <a16:rowId xmlns:a16="http://schemas.microsoft.com/office/drawing/2014/main" xmlns="" val="10003"/>
                   </a:ext>
                 </a:extLst>
               </a:tr>
@@ -8927,7 +8969,7 @@
                 </a:tc>
                 <a:extLst>
                   <a:ext uri="{0D108BD9-81ED-4DB2-BD59-A6C34878D82A}">
-                    <a16:rowId xmlns:a16="http://schemas.microsoft.com/office/drawing/2014/main" val="10004"/>
+                    <a16:rowId xmlns:a16="http://schemas.microsoft.com/office/drawing/2014/main" xmlns="" val="10004"/>
                   </a:ext>
                 </a:extLst>
               </a:tr>
@@ -9018,7 +9060,7 @@
                 </a:tc>
                 <a:extLst>
                   <a:ext uri="{0D108BD9-81ED-4DB2-BD59-A6C34878D82A}">
-                    <a16:rowId xmlns:a16="http://schemas.microsoft.com/office/drawing/2014/main" val="10005"/>
+                    <a16:rowId xmlns:a16="http://schemas.microsoft.com/office/drawing/2014/main" xmlns="" val="10005"/>
                   </a:ext>
                 </a:extLst>
               </a:tr>
@@ -9066,7 +9108,7 @@
                 </a:tc>
                 <a:extLst>
                   <a:ext uri="{0D108BD9-81ED-4DB2-BD59-A6C34878D82A}">
-                    <a16:rowId xmlns:a16="http://schemas.microsoft.com/office/drawing/2014/main" val="10006"/>
+                    <a16:rowId xmlns:a16="http://schemas.microsoft.com/office/drawing/2014/main" xmlns="" val="10006"/>
                   </a:ext>
                 </a:extLst>
               </a:tr>
@@ -9282,7 +9324,7 @@
           <p:cNvPr id="4" name="Date Placeholder 3">
             <a:extLst>
               <a:ext uri="{FF2B5EF4-FFF2-40B4-BE49-F238E27FC236}">
-                <a16:creationId xmlns:a16="http://schemas.microsoft.com/office/drawing/2014/main" id="{88463CF7-8C45-440B-9A13-B1E5238685E7}"/>
+                <a16:creationId xmlns:a16="http://schemas.microsoft.com/office/drawing/2014/main" xmlns="" id="{88463CF7-8C45-440B-9A13-B1E5238685E7}"/>
               </a:ext>
             </a:extLst>
           </p:cNvPr>
@@ -9311,7 +9353,7 @@
           <p:cNvPr id="5" name="Slide Number Placeholder 4">
             <a:extLst>
               <a:ext uri="{FF2B5EF4-FFF2-40B4-BE49-F238E27FC236}">
-                <a16:creationId xmlns:a16="http://schemas.microsoft.com/office/drawing/2014/main" id="{0E92839C-8987-4DAC-9DE5-EB052E2874BA}"/>
+                <a16:creationId xmlns:a16="http://schemas.microsoft.com/office/drawing/2014/main" xmlns="" id="{0E92839C-8987-4DAC-9DE5-EB052E2874BA}"/>
               </a:ext>
             </a:extLst>
           </p:cNvPr>
@@ -9340,7 +9382,7 @@
           <p:cNvPr id="8" name="TextBox 7">
             <a:extLst>
               <a:ext uri="{FF2B5EF4-FFF2-40B4-BE49-F238E27FC236}">
-                <a16:creationId xmlns:a16="http://schemas.microsoft.com/office/drawing/2014/main" id="{0A4981EF-BD07-459E-8C30-127612E45F64}"/>
+                <a16:creationId xmlns:a16="http://schemas.microsoft.com/office/drawing/2014/main" xmlns="" id="{0A4981EF-BD07-459E-8C30-127612E45F64}"/>
               </a:ext>
             </a:extLst>
           </p:cNvPr>
@@ -9429,7 +9471,7 @@
           <p:cNvPr id="10" name="Picture 9">
             <a:extLst>
               <a:ext uri="{FF2B5EF4-FFF2-40B4-BE49-F238E27FC236}">
-                <a16:creationId xmlns:a16="http://schemas.microsoft.com/office/drawing/2014/main" id="{B2676F85-090B-40D8-92F6-E207889BE9A1}"/>
+                <a16:creationId xmlns:a16="http://schemas.microsoft.com/office/drawing/2014/main" xmlns="" id="{B2676F85-090B-40D8-92F6-E207889BE9A1}"/>
               </a:ext>
             </a:extLst>
           </p:cNvPr>
@@ -9465,7 +9507,7 @@
           <p:cNvPr id="11" name="TextBox 10">
             <a:extLst>
               <a:ext uri="{FF2B5EF4-FFF2-40B4-BE49-F238E27FC236}">
-                <a16:creationId xmlns:a16="http://schemas.microsoft.com/office/drawing/2014/main" id="{30EAFCDD-E41C-499C-9F4F-2A06804D075C}"/>
+                <a16:creationId xmlns:a16="http://schemas.microsoft.com/office/drawing/2014/main" xmlns="" id="{30EAFCDD-E41C-499C-9F4F-2A06804D075C}"/>
               </a:ext>
             </a:extLst>
           </p:cNvPr>

</xml_diff>